<commit_message>
Adiciona a apresentação final
</commit_message>
<xml_diff>
--- a/doc/apresentacao_projeto_arquitetural.pptx
+++ b/doc/apresentacao_projeto_arquitetural.pptx
@@ -3236,7 +3236,7 @@
         <p:spPr>
           <a:xfrm>
             <a:off x="0" y="4599000"/>
-            <a:ext cx="9142920" cy="850680"/>
+            <a:ext cx="9142560" cy="850320"/>
           </a:xfrm>
           <a:prstGeom prst="rect">
             <a:avLst/>
@@ -3288,7 +3288,7 @@
                 <a:latin typeface="Calibri"/>
                 <a:ea typeface="Calibri"/>
               </a:rPr>
-              <a:t>Orientador: Will Machado</a:t>
+              <a:t>Orientadores: Luiz Alberto / Will Machado</a:t>
             </a:r>
             <a:endParaRPr b="0" lang="en-US" sz="2500" spc="-1" strike="noStrike">
               <a:latin typeface="Arial"/>
@@ -3305,7 +3305,7 @@
         <p:spPr>
           <a:xfrm>
             <a:off x="997560" y="1805040"/>
-            <a:ext cx="7064640" cy="2587680"/>
+            <a:ext cx="7064280" cy="2587320"/>
           </a:xfrm>
           <a:prstGeom prst="roundRect">
             <a:avLst>
@@ -3339,7 +3339,7 @@
             <a:noFill/>
           </a:ln>
           <a:effectLst>
-            <a:outerShdw algn="ctr" blurRad="57785" dir="3164682" dist="32112">
+            <a:outerShdw algn="ctr" blurRad="57785" dir="3172144" dist="31608">
               <a:srgbClr val="000000">
                 <a:alpha val="30000"/>
               </a:srgbClr>
@@ -3492,7 +3492,7 @@
         <p:spPr>
           <a:xfrm>
             <a:off x="0" y="1001880"/>
-            <a:ext cx="9142920" cy="664200"/>
+            <a:ext cx="9142560" cy="663840"/>
           </a:xfrm>
           <a:prstGeom prst="rect">
             <a:avLst/>
@@ -3536,7 +3536,7 @@
         <p:spPr>
           <a:xfrm>
             <a:off x="206280" y="1100160"/>
-            <a:ext cx="8735040" cy="470520"/>
+            <a:ext cx="8734680" cy="470160"/>
           </a:xfrm>
           <a:prstGeom prst="rect">
             <a:avLst/>
@@ -3585,7 +3585,7 @@
         <p:spPr>
           <a:xfrm>
             <a:off x="179280" y="1770120"/>
-            <a:ext cx="8826840" cy="4118400"/>
+            <a:ext cx="8826480" cy="4118040"/>
           </a:xfrm>
           <a:prstGeom prst="rect">
             <a:avLst/>
@@ -3604,6 +3604,11 @@
         <p:txBody>
           <a:bodyPr lIns="90000" rIns="90000" tIns="45000" bIns="45000"/>
           <a:p>
+            <a:pPr>
+              <a:lnSpc>
+                <a:spcPct val="100000"/>
+              </a:lnSpc>
+            </a:pPr>
             <a:r>
               <a:rPr b="1" lang="en-US" sz="1300" spc="-1" strike="noStrike">
                 <a:solidFill>
@@ -3639,6 +3644,11 @@
             </a:endParaRPr>
           </a:p>
           <a:p>
+            <a:pPr>
+              <a:lnSpc>
+                <a:spcPct val="100000"/>
+              </a:lnSpc>
+            </a:pPr>
             <a:r>
               <a:rPr b="1" lang="en-US" sz="1300" spc="-1" strike="noStrike">
                 <a:solidFill>
@@ -3674,6 +3684,11 @@
             </a:endParaRPr>
           </a:p>
           <a:p>
+            <a:pPr>
+              <a:lnSpc>
+                <a:spcPct val="100000"/>
+              </a:lnSpc>
+            </a:pPr>
             <a:r>
               <a:rPr b="1" lang="en-US" sz="1300" spc="-1" strike="noStrike">
                 <a:solidFill>
@@ -3709,6 +3724,11 @@
             </a:endParaRPr>
           </a:p>
           <a:p>
+            <a:pPr>
+              <a:lnSpc>
+                <a:spcPct val="100000"/>
+              </a:lnSpc>
+            </a:pPr>
             <a:r>
               <a:rPr b="1" lang="en-US" sz="1300" spc="-1" strike="noStrike">
                 <a:solidFill>
@@ -3744,6 +3764,11 @@
             </a:endParaRPr>
           </a:p>
           <a:p>
+            <a:pPr>
+              <a:lnSpc>
+                <a:spcPct val="100000"/>
+              </a:lnSpc>
+            </a:pPr>
             <a:r>
               <a:rPr b="1" lang="en-US" sz="1300" spc="-1" strike="noStrike">
                 <a:solidFill>
@@ -3779,6 +3804,11 @@
             </a:endParaRPr>
           </a:p>
           <a:p>
+            <a:pPr>
+              <a:lnSpc>
+                <a:spcPct val="100000"/>
+              </a:lnSpc>
+            </a:pPr>
             <a:r>
               <a:rPr b="1" lang="en-US" sz="1300" spc="-1" strike="noStrike">
                 <a:solidFill>
@@ -3866,7 +3896,7 @@
         <p:spPr>
           <a:xfrm>
             <a:off x="228600" y="461880"/>
-            <a:ext cx="8825400" cy="445320"/>
+            <a:ext cx="8825040" cy="444960"/>
           </a:xfrm>
           <a:prstGeom prst="rect">
             <a:avLst/>
@@ -3972,7 +4002,7 @@
         <p:spPr>
           <a:xfrm>
             <a:off x="0" y="1001880"/>
-            <a:ext cx="9142920" cy="664200"/>
+            <a:ext cx="9142560" cy="663840"/>
           </a:xfrm>
           <a:prstGeom prst="rect">
             <a:avLst/>
@@ -4016,7 +4046,7 @@
         <p:spPr>
           <a:xfrm>
             <a:off x="206280" y="1100160"/>
-            <a:ext cx="8735040" cy="470520"/>
+            <a:ext cx="8734680" cy="470160"/>
           </a:xfrm>
           <a:prstGeom prst="rect">
             <a:avLst/>
@@ -4065,7 +4095,7 @@
         <p:spPr>
           <a:xfrm>
             <a:off x="179280" y="1770120"/>
-            <a:ext cx="8826840" cy="4118400"/>
+            <a:ext cx="8826480" cy="4118040"/>
           </a:xfrm>
           <a:prstGeom prst="rect">
             <a:avLst/>
@@ -4084,6 +4114,11 @@
         <p:txBody>
           <a:bodyPr lIns="90000" rIns="90000" tIns="45000" bIns="45000"/>
           <a:p>
+            <a:pPr>
+              <a:lnSpc>
+                <a:spcPct val="100000"/>
+              </a:lnSpc>
+            </a:pPr>
             <a:r>
               <a:rPr b="0" lang="en-US" sz="2000" spc="-1" strike="noStrike">
                 <a:solidFill>
@@ -4109,11 +4144,21 @@
             </a:endParaRPr>
           </a:p>
           <a:p>
+            <a:pPr>
+              <a:lnSpc>
+                <a:spcPct val="100000"/>
+              </a:lnSpc>
+            </a:pPr>
             <a:endParaRPr b="0" lang="en-US" sz="2000" spc="-1" strike="noStrike">
               <a:latin typeface="Arial"/>
             </a:endParaRPr>
           </a:p>
           <a:p>
+            <a:pPr>
+              <a:lnSpc>
+                <a:spcPct val="100000"/>
+              </a:lnSpc>
+            </a:pPr>
             <a:r>
               <a:rPr b="0" lang="en-US" sz="2000" spc="-1" strike="noStrike">
                 <a:solidFill>
@@ -4139,11 +4184,21 @@
             </a:endParaRPr>
           </a:p>
           <a:p>
+            <a:pPr>
+              <a:lnSpc>
+                <a:spcPct val="100000"/>
+              </a:lnSpc>
+            </a:pPr>
             <a:endParaRPr b="0" lang="en-US" sz="2000" spc="-1" strike="noStrike">
               <a:latin typeface="Arial"/>
             </a:endParaRPr>
           </a:p>
           <a:p>
+            <a:pPr>
+              <a:lnSpc>
+                <a:spcPct val="100000"/>
+              </a:lnSpc>
+            </a:pPr>
             <a:r>
               <a:rPr b="0" lang="en-US" sz="2000" spc="-1" strike="noStrike">
                 <a:solidFill>
@@ -4221,7 +4276,7 @@
         <p:spPr>
           <a:xfrm>
             <a:off x="228600" y="461880"/>
-            <a:ext cx="8825400" cy="445320"/>
+            <a:ext cx="8825040" cy="444960"/>
           </a:xfrm>
           <a:prstGeom prst="rect">
             <a:avLst/>
@@ -4327,7 +4382,7 @@
         <p:spPr>
           <a:xfrm>
             <a:off x="0" y="1001880"/>
-            <a:ext cx="9142920" cy="664200"/>
+            <a:ext cx="9142560" cy="663840"/>
           </a:xfrm>
           <a:prstGeom prst="rect">
             <a:avLst/>
@@ -4371,7 +4426,7 @@
         <p:spPr>
           <a:xfrm>
             <a:off x="206280" y="1100160"/>
-            <a:ext cx="8735040" cy="470520"/>
+            <a:ext cx="8734680" cy="470160"/>
           </a:xfrm>
           <a:prstGeom prst="rect">
             <a:avLst/>
@@ -4420,7 +4475,7 @@
         <p:spPr>
           <a:xfrm>
             <a:off x="179280" y="1770120"/>
-            <a:ext cx="8826840" cy="4118400"/>
+            <a:ext cx="8826480" cy="4118040"/>
           </a:xfrm>
           <a:prstGeom prst="rect">
             <a:avLst/>
@@ -4515,7 +4570,7 @@
         <p:spPr>
           <a:xfrm>
             <a:off x="228600" y="461880"/>
-            <a:ext cx="8825400" cy="445320"/>
+            <a:ext cx="8825040" cy="444960"/>
           </a:xfrm>
           <a:prstGeom prst="rect">
             <a:avLst/>
@@ -4621,7 +4676,7 @@
         <p:spPr>
           <a:xfrm>
             <a:off x="0" y="1001880"/>
-            <a:ext cx="9142920" cy="664200"/>
+            <a:ext cx="9142560" cy="663840"/>
           </a:xfrm>
           <a:prstGeom prst="rect">
             <a:avLst/>
@@ -4665,7 +4720,7 @@
         <p:spPr>
           <a:xfrm>
             <a:off x="206280" y="1100160"/>
-            <a:ext cx="8735040" cy="470520"/>
+            <a:ext cx="8734680" cy="470160"/>
           </a:xfrm>
           <a:prstGeom prst="rect">
             <a:avLst/>
@@ -4714,7 +4769,7 @@
         <p:spPr>
           <a:xfrm>
             <a:off x="179280" y="1770120"/>
-            <a:ext cx="8826840" cy="4118400"/>
+            <a:ext cx="8826480" cy="4118040"/>
           </a:xfrm>
           <a:prstGeom prst="rect">
             <a:avLst/>
@@ -4763,7 +4818,7 @@
             </a:endParaRPr>
           </a:p>
           <a:p>
-            <a:pPr marL="216000" indent="-215280">
+            <a:pPr marL="216000" indent="-214920">
               <a:lnSpc>
                 <a:spcPct val="100000"/>
               </a:lnSpc>
@@ -4795,7 +4850,7 @@
             </a:endParaRPr>
           </a:p>
           <a:p>
-            <a:pPr marL="216000" indent="-215280">
+            <a:pPr marL="216000" indent="-214920">
               <a:lnSpc>
                 <a:spcPct val="100000"/>
               </a:lnSpc>
@@ -4837,7 +4892,7 @@
             </a:endParaRPr>
           </a:p>
           <a:p>
-            <a:pPr marL="216000" indent="-215280">
+            <a:pPr marL="216000" indent="-214920">
               <a:lnSpc>
                 <a:spcPct val="100000"/>
               </a:lnSpc>
@@ -4869,7 +4924,7 @@
             </a:endParaRPr>
           </a:p>
           <a:p>
-            <a:pPr marL="216000" indent="-215280">
+            <a:pPr marL="216000" indent="-214920">
               <a:lnSpc>
                 <a:spcPct val="100000"/>
               </a:lnSpc>
@@ -4937,7 +4992,7 @@
         <p:spPr>
           <a:xfrm>
             <a:off x="228600" y="461880"/>
-            <a:ext cx="8825400" cy="445320"/>
+            <a:ext cx="8825040" cy="444960"/>
           </a:xfrm>
           <a:prstGeom prst="rect">
             <a:avLst/>
@@ -5043,7 +5098,7 @@
         <p:spPr>
           <a:xfrm>
             <a:off x="0" y="1001880"/>
-            <a:ext cx="9142920" cy="664200"/>
+            <a:ext cx="9142560" cy="663840"/>
           </a:xfrm>
           <a:prstGeom prst="rect">
             <a:avLst/>
@@ -5087,7 +5142,7 @@
         <p:spPr>
           <a:xfrm>
             <a:off x="206280" y="1100160"/>
-            <a:ext cx="8735040" cy="470520"/>
+            <a:ext cx="8734680" cy="470160"/>
           </a:xfrm>
           <a:prstGeom prst="rect">
             <a:avLst/>
@@ -5136,7 +5191,7 @@
         <p:spPr>
           <a:xfrm>
             <a:off x="179280" y="1770120"/>
-            <a:ext cx="8826840" cy="4118400"/>
+            <a:ext cx="8826480" cy="4118040"/>
           </a:xfrm>
           <a:prstGeom prst="rect">
             <a:avLst/>
@@ -5217,7 +5272,7 @@
         <p:spPr>
           <a:xfrm>
             <a:off x="228600" y="461880"/>
-            <a:ext cx="8825400" cy="445320"/>
+            <a:ext cx="8825040" cy="444960"/>
           </a:xfrm>
           <a:prstGeom prst="rect">
             <a:avLst/>
@@ -5270,7 +5325,7 @@
         <p:spPr>
           <a:xfrm>
             <a:off x="1188720" y="1770120"/>
-            <a:ext cx="6674400" cy="4190400"/>
+            <a:ext cx="6674040" cy="4190040"/>
           </a:xfrm>
           <a:prstGeom prst="rect">
             <a:avLst/>
@@ -5346,7 +5401,7 @@
         <p:spPr>
           <a:xfrm>
             <a:off x="0" y="1001880"/>
-            <a:ext cx="9142920" cy="664200"/>
+            <a:ext cx="9142560" cy="663840"/>
           </a:xfrm>
           <a:prstGeom prst="rect">
             <a:avLst/>
@@ -5390,7 +5445,7 @@
         <p:spPr>
           <a:xfrm>
             <a:off x="206280" y="1100160"/>
-            <a:ext cx="8735040" cy="470520"/>
+            <a:ext cx="8734680" cy="470160"/>
           </a:xfrm>
           <a:prstGeom prst="rect">
             <a:avLst/>
@@ -5439,7 +5494,7 @@
         <p:spPr>
           <a:xfrm>
             <a:off x="179280" y="1770120"/>
-            <a:ext cx="8826840" cy="4118400"/>
+            <a:ext cx="8826480" cy="4118040"/>
           </a:xfrm>
           <a:prstGeom prst="rect">
             <a:avLst/>
@@ -5714,7 +5769,7 @@
         <p:spPr>
           <a:xfrm>
             <a:off x="228600" y="461880"/>
-            <a:ext cx="8825400" cy="445320"/>
+            <a:ext cx="8825040" cy="444960"/>
           </a:xfrm>
           <a:prstGeom prst="rect">
             <a:avLst/>
@@ -5820,7 +5875,7 @@
         <p:spPr>
           <a:xfrm>
             <a:off x="0" y="1001880"/>
-            <a:ext cx="9142920" cy="664200"/>
+            <a:ext cx="9142560" cy="663840"/>
           </a:xfrm>
           <a:prstGeom prst="rect">
             <a:avLst/>
@@ -5864,7 +5919,7 @@
         <p:spPr>
           <a:xfrm>
             <a:off x="206280" y="1100160"/>
-            <a:ext cx="8735040" cy="470520"/>
+            <a:ext cx="8734680" cy="470160"/>
           </a:xfrm>
           <a:prstGeom prst="rect">
             <a:avLst/>
@@ -5913,7 +5968,7 @@
         <p:spPr>
           <a:xfrm>
             <a:off x="3516120" y="1824480"/>
-            <a:ext cx="4071960" cy="4118400"/>
+            <a:ext cx="4071600" cy="4118040"/>
           </a:xfrm>
           <a:prstGeom prst="rect">
             <a:avLst/>
@@ -6176,7 +6231,7 @@
         <p:spPr>
           <a:xfrm>
             <a:off x="228600" y="461880"/>
-            <a:ext cx="8825400" cy="445320"/>
+            <a:ext cx="8825040" cy="444960"/>
           </a:xfrm>
           <a:prstGeom prst="rect">
             <a:avLst/>
@@ -6225,7 +6280,7 @@
         <p:spPr>
           <a:xfrm>
             <a:off x="1151280" y="1866960"/>
-            <a:ext cx="2654640" cy="4118400"/>
+            <a:ext cx="2654280" cy="4118040"/>
           </a:xfrm>
           <a:prstGeom prst="rect">
             <a:avLst/>
@@ -6535,7 +6590,7 @@
         <p:spPr>
           <a:xfrm>
             <a:off x="-10440" y="457200"/>
-            <a:ext cx="9142920" cy="365400"/>
+            <a:ext cx="9142560" cy="365040"/>
           </a:xfrm>
           <a:prstGeom prst="rect">
             <a:avLst/>
@@ -6579,7 +6634,7 @@
         <p:spPr>
           <a:xfrm>
             <a:off x="226800" y="365760"/>
-            <a:ext cx="8735040" cy="470520"/>
+            <a:ext cx="8734680" cy="470160"/>
           </a:xfrm>
           <a:prstGeom prst="rect">
             <a:avLst/>
@@ -6628,7 +6683,7 @@
         <p:spPr>
           <a:xfrm>
             <a:off x="179280" y="1770120"/>
-            <a:ext cx="8826840" cy="4118400"/>
+            <a:ext cx="8826480" cy="4118040"/>
           </a:xfrm>
           <a:prstGeom prst="rect">
             <a:avLst/>
@@ -6654,7 +6709,7 @@
         <p:spPr>
           <a:xfrm>
             <a:off x="226800" y="16200"/>
-            <a:ext cx="8825400" cy="445320"/>
+            <a:ext cx="8825040" cy="444960"/>
           </a:xfrm>
           <a:prstGeom prst="rect">
             <a:avLst/>
@@ -6702,7 +6757,7 @@
         </p:nvGraphicFramePr>
         <p:xfrm>
           <a:off x="151920" y="875520"/>
-          <a:ext cx="8781120" cy="4820760"/>
+          <a:ext cx="8781120" cy="4723560"/>
         </p:xfrm>
         <a:graphic>
           <a:graphicData uri="http://schemas.openxmlformats.org/drawingml/2006/table">
@@ -8474,7 +8529,7 @@
         <p:spPr>
           <a:xfrm>
             <a:off x="0" y="1001880"/>
-            <a:ext cx="9142920" cy="664200"/>
+            <a:ext cx="9142560" cy="663840"/>
           </a:xfrm>
           <a:prstGeom prst="rect">
             <a:avLst/>
@@ -8518,7 +8573,7 @@
         <p:spPr>
           <a:xfrm>
             <a:off x="206280" y="1100160"/>
-            <a:ext cx="8735040" cy="470520"/>
+            <a:ext cx="8734680" cy="470160"/>
           </a:xfrm>
           <a:prstGeom prst="rect">
             <a:avLst/>
@@ -8567,7 +8622,7 @@
         <p:spPr>
           <a:xfrm>
             <a:off x="228600" y="461880"/>
-            <a:ext cx="8825400" cy="445320"/>
+            <a:ext cx="8825040" cy="444960"/>
           </a:xfrm>
           <a:prstGeom prst="rect">
             <a:avLst/>
@@ -8620,7 +8675,7 @@
         <p:spPr>
           <a:xfrm>
             <a:off x="182880" y="1097280"/>
-            <a:ext cx="8859240" cy="5475600"/>
+            <a:ext cx="8858880" cy="5475240"/>
           </a:xfrm>
           <a:prstGeom prst="rect">
             <a:avLst/>
@@ -8696,7 +8751,7 @@
         <p:spPr>
           <a:xfrm>
             <a:off x="0" y="1001880"/>
-            <a:ext cx="9142920" cy="664200"/>
+            <a:ext cx="9142560" cy="663840"/>
           </a:xfrm>
           <a:prstGeom prst="rect">
             <a:avLst/>
@@ -8740,7 +8795,7 @@
         <p:spPr>
           <a:xfrm>
             <a:off x="206280" y="1100160"/>
-            <a:ext cx="8735040" cy="470520"/>
+            <a:ext cx="8734680" cy="470160"/>
           </a:xfrm>
           <a:prstGeom prst="rect">
             <a:avLst/>
@@ -8789,7 +8844,7 @@
         <p:spPr>
           <a:xfrm>
             <a:off x="179280" y="1770120"/>
-            <a:ext cx="8826840" cy="4118400"/>
+            <a:ext cx="8826480" cy="4118040"/>
           </a:xfrm>
           <a:prstGeom prst="rect">
             <a:avLst/>
@@ -8815,7 +8870,7 @@
         <p:spPr>
           <a:xfrm>
             <a:off x="228600" y="461880"/>
-            <a:ext cx="8825400" cy="445320"/>
+            <a:ext cx="8825040" cy="444960"/>
           </a:xfrm>
           <a:prstGeom prst="rect">
             <a:avLst/>
@@ -8868,7 +8923,7 @@
         <p:spPr>
           <a:xfrm>
             <a:off x="1188720" y="907560"/>
-            <a:ext cx="7704720" cy="5851440"/>
+            <a:ext cx="7704360" cy="5851080"/>
           </a:xfrm>
           <a:prstGeom prst="rect">
             <a:avLst/>
@@ -8944,7 +8999,7 @@
         <p:spPr>
           <a:xfrm>
             <a:off x="0" y="1001880"/>
-            <a:ext cx="9142920" cy="664200"/>
+            <a:ext cx="9142560" cy="663840"/>
           </a:xfrm>
           <a:prstGeom prst="rect">
             <a:avLst/>
@@ -8988,7 +9043,7 @@
         <p:spPr>
           <a:xfrm>
             <a:off x="206280" y="1100160"/>
-            <a:ext cx="8735040" cy="470520"/>
+            <a:ext cx="8734680" cy="470160"/>
           </a:xfrm>
           <a:prstGeom prst="rect">
             <a:avLst/>
@@ -9037,7 +9092,7 @@
         <p:spPr>
           <a:xfrm>
             <a:off x="179280" y="1770120"/>
-            <a:ext cx="8826840" cy="4118400"/>
+            <a:ext cx="8826480" cy="4118040"/>
           </a:xfrm>
           <a:prstGeom prst="rect">
             <a:avLst/>
@@ -9208,7 +9263,7 @@
         <p:spPr>
           <a:xfrm>
             <a:off x="228600" y="461880"/>
-            <a:ext cx="8825400" cy="445320"/>
+            <a:ext cx="8825040" cy="444960"/>
           </a:xfrm>
           <a:prstGeom prst="rect">
             <a:avLst/>

</xml_diff>